<commit_message>
Plotting Individual Error vs Iteration
Still testing error with growing N, but need to find why ground state
isn't found
</commit_message>
<xml_diff>
--- a/Figures/RBMfigure.pptx
+++ b/Figures/RBMfigure.pptx
@@ -6,6 +6,8 @@
   </p:sldMasterIdLst>
   <p:sldIdLst>
     <p:sldId id="256" r:id="rId2"/>
+    <p:sldId id="257" r:id="rId3"/>
+    <p:sldId id="258" r:id="rId4"/>
   </p:sldIdLst>
   <p:sldSz cx="12192000" cy="6858000"/>
   <p:notesSz cx="6858000" cy="9144000"/>
@@ -104,6 +106,11 @@
       </a:defRPr>
     </a:lvl9pPr>
   </p:defaultTextStyle>
+  <p:extLst>
+    <p:ext uri="{EFAFB233-063F-42B5-8137-9DF3F51BA10A}">
+      <p15:sldGuideLst xmlns:p15="http://schemas.microsoft.com/office/powerpoint/2012/main"/>
+    </p:ext>
+  </p:extLst>
 </p:presentation>
 </file>
 
@@ -256,7 +263,7 @@
           <a:p>
             <a:fld id="{512C11B2-92EB-42FC-99BC-4AAF8E534B76}" type="datetimeFigureOut">
               <a:rPr lang="en-CA" smtClean="0"/>
-              <a:t>2019-11-22</a:t>
+              <a:t>2020-02-22</a:t>
             </a:fld>
             <a:endParaRPr lang="en-CA"/>
           </a:p>
@@ -456,7 +463,7 @@
           <a:p>
             <a:fld id="{512C11B2-92EB-42FC-99BC-4AAF8E534B76}" type="datetimeFigureOut">
               <a:rPr lang="en-CA" smtClean="0"/>
-              <a:t>2019-11-22</a:t>
+              <a:t>2020-02-22</a:t>
             </a:fld>
             <a:endParaRPr lang="en-CA"/>
           </a:p>
@@ -666,7 +673,7 @@
           <a:p>
             <a:fld id="{512C11B2-92EB-42FC-99BC-4AAF8E534B76}" type="datetimeFigureOut">
               <a:rPr lang="en-CA" smtClean="0"/>
-              <a:t>2019-11-22</a:t>
+              <a:t>2020-02-22</a:t>
             </a:fld>
             <a:endParaRPr lang="en-CA"/>
           </a:p>
@@ -866,7 +873,7 @@
           <a:p>
             <a:fld id="{512C11B2-92EB-42FC-99BC-4AAF8E534B76}" type="datetimeFigureOut">
               <a:rPr lang="en-CA" smtClean="0"/>
-              <a:t>2019-11-22</a:t>
+              <a:t>2020-02-22</a:t>
             </a:fld>
             <a:endParaRPr lang="en-CA"/>
           </a:p>
@@ -1142,7 +1149,7 @@
           <a:p>
             <a:fld id="{512C11B2-92EB-42FC-99BC-4AAF8E534B76}" type="datetimeFigureOut">
               <a:rPr lang="en-CA" smtClean="0"/>
-              <a:t>2019-11-22</a:t>
+              <a:t>2020-02-22</a:t>
             </a:fld>
             <a:endParaRPr lang="en-CA"/>
           </a:p>
@@ -1410,7 +1417,7 @@
           <a:p>
             <a:fld id="{512C11B2-92EB-42FC-99BC-4AAF8E534B76}" type="datetimeFigureOut">
               <a:rPr lang="en-CA" smtClean="0"/>
-              <a:t>2019-11-22</a:t>
+              <a:t>2020-02-22</a:t>
             </a:fld>
             <a:endParaRPr lang="en-CA"/>
           </a:p>
@@ -1825,7 +1832,7 @@
           <a:p>
             <a:fld id="{512C11B2-92EB-42FC-99BC-4AAF8E534B76}" type="datetimeFigureOut">
               <a:rPr lang="en-CA" smtClean="0"/>
-              <a:t>2019-11-22</a:t>
+              <a:t>2020-02-22</a:t>
             </a:fld>
             <a:endParaRPr lang="en-CA"/>
           </a:p>
@@ -1967,7 +1974,7 @@
           <a:p>
             <a:fld id="{512C11B2-92EB-42FC-99BC-4AAF8E534B76}" type="datetimeFigureOut">
               <a:rPr lang="en-CA" smtClean="0"/>
-              <a:t>2019-11-22</a:t>
+              <a:t>2020-02-22</a:t>
             </a:fld>
             <a:endParaRPr lang="en-CA"/>
           </a:p>
@@ -2080,7 +2087,7 @@
           <a:p>
             <a:fld id="{512C11B2-92EB-42FC-99BC-4AAF8E534B76}" type="datetimeFigureOut">
               <a:rPr lang="en-CA" smtClean="0"/>
-              <a:t>2019-11-22</a:t>
+              <a:t>2020-02-22</a:t>
             </a:fld>
             <a:endParaRPr lang="en-CA"/>
           </a:p>
@@ -2393,7 +2400,7 @@
           <a:p>
             <a:fld id="{512C11B2-92EB-42FC-99BC-4AAF8E534B76}" type="datetimeFigureOut">
               <a:rPr lang="en-CA" smtClean="0"/>
-              <a:t>2019-11-22</a:t>
+              <a:t>2020-02-22</a:t>
             </a:fld>
             <a:endParaRPr lang="en-CA"/>
           </a:p>
@@ -2682,7 +2689,7 @@
           <a:p>
             <a:fld id="{512C11B2-92EB-42FC-99BC-4AAF8E534B76}" type="datetimeFigureOut">
               <a:rPr lang="en-CA" smtClean="0"/>
-              <a:t>2019-11-22</a:t>
+              <a:t>2020-02-22</a:t>
             </a:fld>
             <a:endParaRPr lang="en-CA"/>
           </a:p>
@@ -2925,7 +2932,7 @@
           <a:p>
             <a:fld id="{512C11B2-92EB-42FC-99BC-4AAF8E534B76}" type="datetimeFigureOut">
               <a:rPr lang="en-CA" smtClean="0"/>
-              <a:t>2019-11-22</a:t>
+              <a:t>2020-02-22</a:t>
             </a:fld>
             <a:endParaRPr lang="en-CA"/>
           </a:p>
@@ -4120,8 +4127,8 @@
         </p:nvSpPr>
         <p:spPr>
           <a:xfrm>
-            <a:off x="6260523" y="1599742"/>
-            <a:ext cx="1416670" cy="369332"/>
+            <a:off x="6264679" y="1599742"/>
+            <a:ext cx="1580882" cy="369332"/>
           </a:xfrm>
           <a:prstGeom prst="rect">
             <a:avLst/>
@@ -4135,7 +4142,9 @@
           <a:lstStyle/>
           <a:p>
             <a:r>
-              <a:rPr lang="en-CA" dirty="0"/>
+              <a:rPr lang="en-CA" b="1" dirty="0">
+                <a:latin typeface="Avenir Next LT Pro Light" panose="020B0304020202020204" pitchFamily="34" charset="0"/>
+              </a:rPr>
               <a:t>Hidden Layer</a:t>
             </a:r>
           </a:p>
@@ -4155,8 +4164,8 @@
         </p:nvSpPr>
         <p:spPr>
           <a:xfrm>
-            <a:off x="2989118" y="1599742"/>
-            <a:ext cx="1355756" cy="369332"/>
+            <a:off x="2806246" y="1599742"/>
+            <a:ext cx="1486946" cy="369332"/>
           </a:xfrm>
           <a:prstGeom prst="rect">
             <a:avLst/>
@@ -4170,14 +4179,16 @@
           <a:lstStyle/>
           <a:p>
             <a:r>
-              <a:rPr lang="en-CA" dirty="0"/>
+              <a:rPr lang="en-CA" b="1" dirty="0">
+                <a:latin typeface="Avenir Next LT Pro Light" panose="020B0304020202020204" pitchFamily="34" charset="0"/>
+              </a:rPr>
               <a:t>Visible Layer</a:t>
             </a:r>
           </a:p>
         </p:txBody>
       </p:sp>
-      <mc:AlternateContent xmlns:mc="http://schemas.openxmlformats.org/markup-compatibility/2006">
-        <mc:Choice xmlns:a14="http://schemas.microsoft.com/office/drawing/2010/main" Requires="a14">
+      <mc:AlternateContent xmlns:mc="http://schemas.openxmlformats.org/markup-compatibility/2006" xmlns:a14="http://schemas.microsoft.com/office/drawing/2010/main">
+        <mc:Choice Requires="a14">
           <p:sp>
             <p:nvSpPr>
               <p:cNvPr id="11" name="TextBox 10">
@@ -4192,7 +4203,7 @@
             </p:nvSpPr>
             <p:spPr>
               <a:xfrm>
-                <a:off x="3489277" y="2208067"/>
+                <a:off x="3468466" y="2225335"/>
                 <a:ext cx="310661" cy="276999"/>
               </a:xfrm>
               <a:prstGeom prst="rect">
@@ -4206,6 +4217,7 @@
               </a:bodyPr>
               <a:lstStyle/>
               <a:p>
+                <a:pPr/>
                 <a14:m>
                   <m:oMathPara xmlns:m="http://schemas.openxmlformats.org/officeDocument/2006/math">
                     <m:oMathParaPr>
@@ -4253,7 +4265,7 @@
             </p:txBody>
           </p:sp>
         </mc:Choice>
-        <mc:Fallback>
+        <mc:Fallback xmlns="">
           <p:sp>
             <p:nvSpPr>
               <p:cNvPr id="11" name="TextBox 10">
@@ -4270,16 +4282,16 @@
             </p:nvSpPr>
             <p:spPr>
               <a:xfrm>
-                <a:off x="3489277" y="2208067"/>
+                <a:off x="3468466" y="2225335"/>
                 <a:ext cx="310661" cy="276999"/>
               </a:xfrm>
               <a:prstGeom prst="rect">
                 <a:avLst/>
               </a:prstGeom>
               <a:blipFill>
-                <a:blip r:embed="rId2"/>
+                <a:blip r:embed="rId10"/>
                 <a:stretch>
-                  <a:fillRect l="-11765" r="-1961" b="-17391"/>
+                  <a:fillRect l="-11765" b="-20000"/>
                 </a:stretch>
               </a:blipFill>
             </p:spPr>
@@ -4342,8 +4354,8 @@
           </a:p>
         </p:txBody>
       </p:sp>
-      <mc:AlternateContent xmlns:mc="http://schemas.openxmlformats.org/markup-compatibility/2006">
-        <mc:Choice xmlns:a14="http://schemas.microsoft.com/office/drawing/2010/main" Requires="a14">
+      <mc:AlternateContent xmlns:mc="http://schemas.openxmlformats.org/markup-compatibility/2006" xmlns:a14="http://schemas.microsoft.com/office/drawing/2010/main">
+        <mc:Choice Requires="a14">
           <p:sp>
             <p:nvSpPr>
               <p:cNvPr id="13" name="TextBox 12">
@@ -4372,6 +4384,7 @@
               </a:bodyPr>
               <a:lstStyle/>
               <a:p>
+                <a:pPr/>
                 <a14:m>
                   <m:oMathPara xmlns:m="http://schemas.openxmlformats.org/officeDocument/2006/math">
                     <m:oMathParaPr>
@@ -4419,7 +4432,7 @@
             </p:txBody>
           </p:sp>
         </mc:Choice>
-        <mc:Fallback>
+        <mc:Fallback xmlns="">
           <p:sp>
             <p:nvSpPr>
               <p:cNvPr id="13" name="TextBox 12">
@@ -4508,8 +4521,8 @@
           </a:p>
         </p:txBody>
       </p:sp>
-      <mc:AlternateContent xmlns:mc="http://schemas.openxmlformats.org/markup-compatibility/2006">
-        <mc:Choice xmlns:a14="http://schemas.microsoft.com/office/drawing/2010/main" Requires="a14">
+      <mc:AlternateContent xmlns:mc="http://schemas.openxmlformats.org/markup-compatibility/2006" xmlns:a14="http://schemas.microsoft.com/office/drawing/2010/main">
+        <mc:Choice Requires="a14">
           <p:sp>
             <p:nvSpPr>
               <p:cNvPr id="17" name="TextBox 16">
@@ -4538,6 +4551,7 @@
               </a:bodyPr>
               <a:lstStyle/>
               <a:p>
+                <a:pPr/>
                 <a14:m>
                   <m:oMathPara xmlns:m="http://schemas.openxmlformats.org/officeDocument/2006/math">
                     <m:oMathParaPr>
@@ -4585,7 +4599,7 @@
             </p:txBody>
           </p:sp>
         </mc:Choice>
-        <mc:Fallback>
+        <mc:Fallback xmlns="">
           <p:sp>
             <p:nvSpPr>
               <p:cNvPr id="17" name="TextBox 16">
@@ -4721,8 +4735,8 @@
           </a:p>
         </p:txBody>
       </p:sp>
-      <mc:AlternateContent xmlns:mc="http://schemas.openxmlformats.org/markup-compatibility/2006">
-        <mc:Choice xmlns:a14="http://schemas.microsoft.com/office/drawing/2010/main" Requires="a14">
+      <mc:AlternateContent xmlns:mc="http://schemas.openxmlformats.org/markup-compatibility/2006" xmlns:a14="http://schemas.microsoft.com/office/drawing/2010/main">
+        <mc:Choice Requires="a14">
           <p:sp>
             <p:nvSpPr>
               <p:cNvPr id="20" name="TextBox 19">
@@ -4751,6 +4765,7 @@
               </a:bodyPr>
               <a:lstStyle/>
               <a:p>
+                <a:pPr/>
                 <a14:m>
                   <m:oMathPara xmlns:m="http://schemas.openxmlformats.org/officeDocument/2006/math">
                     <m:oMathParaPr>
@@ -4798,7 +4813,7 @@
             </p:txBody>
           </p:sp>
         </mc:Choice>
-        <mc:Fallback>
+        <mc:Fallback xmlns="">
           <p:sp>
             <p:nvSpPr>
               <p:cNvPr id="20" name="TextBox 19">
@@ -5069,8 +5084,8 @@
           </a:p>
         </p:txBody>
       </p:sp>
-      <mc:AlternateContent xmlns:mc="http://schemas.openxmlformats.org/markup-compatibility/2006">
-        <mc:Choice xmlns:a14="http://schemas.microsoft.com/office/drawing/2010/main" Requires="a14">
+      <mc:AlternateContent xmlns:mc="http://schemas.openxmlformats.org/markup-compatibility/2006" xmlns:a14="http://schemas.microsoft.com/office/drawing/2010/main">
+        <mc:Choice Requires="a14">
           <p:sp>
             <p:nvSpPr>
               <p:cNvPr id="30" name="TextBox 29">
@@ -5099,6 +5114,7 @@
               </a:bodyPr>
               <a:lstStyle/>
               <a:p>
+                <a:pPr/>
                 <a14:m>
                   <m:oMathPara xmlns:m="http://schemas.openxmlformats.org/officeDocument/2006/math">
                     <m:oMathParaPr>
@@ -5138,7 +5154,7 @@
             </p:txBody>
           </p:sp>
         </mc:Choice>
-        <mc:Fallback>
+        <mc:Fallback xmlns="">
           <p:sp>
             <p:nvSpPr>
               <p:cNvPr id="30" name="TextBox 29">
@@ -5183,8 +5199,8 @@
           </p:sp>
         </mc:Fallback>
       </mc:AlternateContent>
-      <mc:AlternateContent xmlns:mc="http://schemas.openxmlformats.org/markup-compatibility/2006">
-        <mc:Choice xmlns:a14="http://schemas.microsoft.com/office/drawing/2010/main" Requires="a14">
+      <mc:AlternateContent xmlns:mc="http://schemas.openxmlformats.org/markup-compatibility/2006" xmlns:a14="http://schemas.microsoft.com/office/drawing/2010/main">
+        <mc:Choice Requires="a14">
           <p:sp>
             <p:nvSpPr>
               <p:cNvPr id="31" name="TextBox 30">
@@ -5213,6 +5229,7 @@
               </a:bodyPr>
               <a:lstStyle/>
               <a:p>
+                <a:pPr/>
                 <a14:m>
                   <m:oMathPara xmlns:m="http://schemas.openxmlformats.org/officeDocument/2006/math">
                     <m:oMathParaPr>
@@ -5252,7 +5269,7 @@
             </p:txBody>
           </p:sp>
         </mc:Choice>
-        <mc:Fallback>
+        <mc:Fallback xmlns="">
           <p:sp>
             <p:nvSpPr>
               <p:cNvPr id="31" name="TextBox 30">
@@ -5297,8 +5314,8 @@
           </p:sp>
         </mc:Fallback>
       </mc:AlternateContent>
-      <mc:AlternateContent xmlns:mc="http://schemas.openxmlformats.org/markup-compatibility/2006">
-        <mc:Choice xmlns:a14="http://schemas.microsoft.com/office/drawing/2010/main" Requires="a14">
+      <mc:AlternateContent xmlns:mc="http://schemas.openxmlformats.org/markup-compatibility/2006" xmlns:a14="http://schemas.microsoft.com/office/drawing/2010/main">
+        <mc:Choice Requires="a14">
           <p:sp>
             <p:nvSpPr>
               <p:cNvPr id="32" name="TextBox 31">
@@ -5327,6 +5344,7 @@
               </a:bodyPr>
               <a:lstStyle/>
               <a:p>
+                <a:pPr/>
                 <a14:m>
                   <m:oMathPara xmlns:m="http://schemas.openxmlformats.org/officeDocument/2006/math">
                     <m:oMathParaPr>
@@ -5366,7 +5384,7 @@
             </p:txBody>
           </p:sp>
         </mc:Choice>
-        <mc:Fallback>
+        <mc:Fallback xmlns="">
           <p:sp>
             <p:nvSpPr>
               <p:cNvPr id="32" name="TextBox 31">
@@ -5411,8 +5429,8 @@
           </p:sp>
         </mc:Fallback>
       </mc:AlternateContent>
-      <mc:AlternateContent xmlns:mc="http://schemas.openxmlformats.org/markup-compatibility/2006">
-        <mc:Choice xmlns:a14="http://schemas.microsoft.com/office/drawing/2010/main" Requires="a14">
+      <mc:AlternateContent xmlns:mc="http://schemas.openxmlformats.org/markup-compatibility/2006" xmlns:a14="http://schemas.microsoft.com/office/drawing/2010/main">
+        <mc:Choice Requires="a14">
           <p:sp>
             <p:nvSpPr>
               <p:cNvPr id="33" name="TextBox 32">
@@ -5441,6 +5459,7 @@
               </a:bodyPr>
               <a:lstStyle/>
               <a:p>
+                <a:pPr/>
                 <a14:m>
                   <m:oMathPara xmlns:m="http://schemas.openxmlformats.org/officeDocument/2006/math">
                     <m:oMathParaPr>
@@ -5480,7 +5499,7 @@
             </p:txBody>
           </p:sp>
         </mc:Choice>
-        <mc:Fallback>
+        <mc:Fallback xmlns="">
           <p:sp>
             <p:nvSpPr>
               <p:cNvPr id="33" name="TextBox 32">
@@ -5573,10 +5592,1700 @@
           </a:p>
         </p:txBody>
       </p:sp>
+      <mc:AlternateContent xmlns:mc="http://schemas.openxmlformats.org/markup-compatibility/2006" xmlns:a14="http://schemas.microsoft.com/office/drawing/2010/main">
+        <mc:Choice Requires="a14">
+          <p:sp>
+            <p:nvSpPr>
+              <p:cNvPr id="39" name="TextBox 38">
+                <a:extLst>
+                  <a:ext uri="{FF2B5EF4-FFF2-40B4-BE49-F238E27FC236}">
+                    <a16:creationId xmlns:a16="http://schemas.microsoft.com/office/drawing/2014/main" id="{5661CA34-387C-483E-96D6-0E632A492E75}"/>
+                  </a:ext>
+                </a:extLst>
+              </p:cNvPr>
+              <p:cNvSpPr txBox="1"/>
+              <p:nvPr/>
+            </p:nvSpPr>
+            <p:spPr>
+              <a:xfrm>
+                <a:off x="2939843" y="2225335"/>
+                <a:ext cx="283154" cy="276999"/>
+              </a:xfrm>
+              <a:prstGeom prst="rect">
+                <a:avLst/>
+              </a:prstGeom>
+              <a:noFill/>
+            </p:spPr>
+            <p:txBody>
+              <a:bodyPr wrap="none" lIns="0" tIns="0" rIns="0" bIns="0" rtlCol="0">
+                <a:spAutoFit/>
+              </a:bodyPr>
+              <a:lstStyle/>
+              <a:p>
+                <a:pPr/>
+                <a14:m>
+                  <m:oMathPara xmlns:m="http://schemas.openxmlformats.org/officeDocument/2006/math">
+                    <m:oMathParaPr>
+                      <m:jc m:val="centerGroup"/>
+                    </m:oMathParaPr>
+                    <m:oMath xmlns:m="http://schemas.openxmlformats.org/officeDocument/2006/math">
+                      <m:sSub>
+                        <m:sSubPr>
+                          <m:ctrlPr>
+                            <a:rPr lang="en-CA" b="0" i="1" smtClean="0">
+                              <a:latin typeface="Cambria Math" panose="02040503050406030204" pitchFamily="18" charset="0"/>
+                            </a:rPr>
+                          </m:ctrlPr>
+                        </m:sSubPr>
+                        <m:e>
+                          <m:r>
+                            <a:rPr lang="en-CA" b="0" i="1" smtClean="0">
+                              <a:latin typeface="Cambria Math" panose="02040503050406030204" pitchFamily="18" charset="0"/>
+                            </a:rPr>
+                            <m:t>𝑎</m:t>
+                          </m:r>
+                        </m:e>
+                        <m:sub>
+                          <m:r>
+                            <a:rPr lang="en-CA" b="0" i="1" smtClean="0">
+                              <a:latin typeface="Cambria Math" panose="02040503050406030204" pitchFamily="18" charset="0"/>
+                            </a:rPr>
+                            <m:t>1</m:t>
+                          </m:r>
+                        </m:sub>
+                      </m:sSub>
+                    </m:oMath>
+                  </m:oMathPara>
+                </a14:m>
+                <a:endParaRPr lang="en-CA" b="0" dirty="0"/>
+              </a:p>
+            </p:txBody>
+          </p:sp>
+        </mc:Choice>
+        <mc:Fallback xmlns="">
+          <p:sp>
+            <p:nvSpPr>
+              <p:cNvPr id="39" name="TextBox 38">
+                <a:extLst>
+                  <a:ext uri="{FF2B5EF4-FFF2-40B4-BE49-F238E27FC236}">
+                    <a16:creationId xmlns:a16="http://schemas.microsoft.com/office/drawing/2014/main" id="{5661CA34-387C-483E-96D6-0E632A492E75}"/>
+                  </a:ext>
+                </a:extLst>
+              </p:cNvPr>
+              <p:cNvSpPr txBox="1">
+                <a:spLocks noRot="1" noChangeAspect="1" noMove="1" noResize="1" noEditPoints="1" noAdjustHandles="1" noChangeArrowheads="1" noChangeShapeType="1" noTextEdit="1"/>
+              </p:cNvSpPr>
+              <p:nvPr/>
+            </p:nvSpPr>
+            <p:spPr>
+              <a:xfrm>
+                <a:off x="2939843" y="2225335"/>
+                <a:ext cx="283154" cy="276999"/>
+              </a:xfrm>
+              <a:prstGeom prst="rect">
+                <a:avLst/>
+              </a:prstGeom>
+              <a:blipFill>
+                <a:blip r:embed="rId11"/>
+                <a:stretch>
+                  <a:fillRect l="-12766" r="-6383" b="-17778"/>
+                </a:stretch>
+              </a:blipFill>
+            </p:spPr>
+            <p:txBody>
+              <a:bodyPr/>
+              <a:lstStyle/>
+              <a:p>
+                <a:r>
+                  <a:rPr lang="en-CA">
+                    <a:noFill/>
+                  </a:rPr>
+                  <a:t> </a:t>
+                </a:r>
+              </a:p>
+            </p:txBody>
+          </p:sp>
+        </mc:Fallback>
+      </mc:AlternateContent>
+      <mc:AlternateContent xmlns:mc="http://schemas.openxmlformats.org/markup-compatibility/2006" xmlns:a14="http://schemas.microsoft.com/office/drawing/2010/main">
+        <mc:Choice Requires="a14">
+          <p:sp>
+            <p:nvSpPr>
+              <p:cNvPr id="40" name="TextBox 39">
+                <a:extLst>
+                  <a:ext uri="{FF2B5EF4-FFF2-40B4-BE49-F238E27FC236}">
+                    <a16:creationId xmlns:a16="http://schemas.microsoft.com/office/drawing/2014/main" id="{0D994A53-71DA-4811-9EC6-16E85568027E}"/>
+                  </a:ext>
+                </a:extLst>
+              </p:cNvPr>
+              <p:cNvSpPr txBox="1"/>
+              <p:nvPr/>
+            </p:nvSpPr>
+            <p:spPr>
+              <a:xfrm>
+                <a:off x="2957993" y="2814465"/>
+                <a:ext cx="288477" cy="276999"/>
+              </a:xfrm>
+              <a:prstGeom prst="rect">
+                <a:avLst/>
+              </a:prstGeom>
+              <a:noFill/>
+            </p:spPr>
+            <p:txBody>
+              <a:bodyPr wrap="none" lIns="0" tIns="0" rIns="0" bIns="0" rtlCol="0">
+                <a:spAutoFit/>
+              </a:bodyPr>
+              <a:lstStyle/>
+              <a:p>
+                <a:pPr/>
+                <a14:m>
+                  <m:oMathPara xmlns:m="http://schemas.openxmlformats.org/officeDocument/2006/math">
+                    <m:oMathParaPr>
+                      <m:jc m:val="centerGroup"/>
+                    </m:oMathParaPr>
+                    <m:oMath xmlns:m="http://schemas.openxmlformats.org/officeDocument/2006/math">
+                      <m:sSub>
+                        <m:sSubPr>
+                          <m:ctrlPr>
+                            <a:rPr lang="en-CA" b="0" i="1" smtClean="0">
+                              <a:latin typeface="Cambria Math" panose="02040503050406030204" pitchFamily="18" charset="0"/>
+                            </a:rPr>
+                          </m:ctrlPr>
+                        </m:sSubPr>
+                        <m:e>
+                          <m:r>
+                            <a:rPr lang="en-CA" b="0" i="1" smtClean="0">
+                              <a:latin typeface="Cambria Math" panose="02040503050406030204" pitchFamily="18" charset="0"/>
+                            </a:rPr>
+                            <m:t>𝑎</m:t>
+                          </m:r>
+                        </m:e>
+                        <m:sub>
+                          <m:r>
+                            <a:rPr lang="en-CA" b="0" i="1" smtClean="0">
+                              <a:latin typeface="Cambria Math" panose="02040503050406030204" pitchFamily="18" charset="0"/>
+                            </a:rPr>
+                            <m:t>2</m:t>
+                          </m:r>
+                        </m:sub>
+                      </m:sSub>
+                    </m:oMath>
+                  </m:oMathPara>
+                </a14:m>
+                <a:endParaRPr lang="en-CA" b="0" dirty="0"/>
+              </a:p>
+            </p:txBody>
+          </p:sp>
+        </mc:Choice>
+        <mc:Fallback xmlns="">
+          <p:sp>
+            <p:nvSpPr>
+              <p:cNvPr id="40" name="TextBox 39">
+                <a:extLst>
+                  <a:ext uri="{FF2B5EF4-FFF2-40B4-BE49-F238E27FC236}">
+                    <a16:creationId xmlns:a16="http://schemas.microsoft.com/office/drawing/2014/main" id="{0D994A53-71DA-4811-9EC6-16E85568027E}"/>
+                  </a:ext>
+                </a:extLst>
+              </p:cNvPr>
+              <p:cNvSpPr txBox="1">
+                <a:spLocks noRot="1" noChangeAspect="1" noMove="1" noResize="1" noEditPoints="1" noAdjustHandles="1" noChangeArrowheads="1" noChangeShapeType="1" noTextEdit="1"/>
+              </p:cNvSpPr>
+              <p:nvPr/>
+            </p:nvSpPr>
+            <p:spPr>
+              <a:xfrm>
+                <a:off x="2957993" y="2814465"/>
+                <a:ext cx="288477" cy="276999"/>
+              </a:xfrm>
+              <a:prstGeom prst="rect">
+                <a:avLst/>
+              </a:prstGeom>
+              <a:blipFill>
+                <a:blip r:embed="rId12"/>
+                <a:stretch>
+                  <a:fillRect l="-12500" r="-6250" b="-15556"/>
+                </a:stretch>
+              </a:blipFill>
+            </p:spPr>
+            <p:txBody>
+              <a:bodyPr/>
+              <a:lstStyle/>
+              <a:p>
+                <a:r>
+                  <a:rPr lang="en-CA">
+                    <a:noFill/>
+                  </a:rPr>
+                  <a:t> </a:t>
+                </a:r>
+              </a:p>
+            </p:txBody>
+          </p:sp>
+        </mc:Fallback>
+      </mc:AlternateContent>
+      <mc:AlternateContent xmlns:mc="http://schemas.openxmlformats.org/markup-compatibility/2006" xmlns:a14="http://schemas.microsoft.com/office/drawing/2010/main">
+        <mc:Choice Requires="a14">
+          <p:sp>
+            <p:nvSpPr>
+              <p:cNvPr id="41" name="TextBox 40">
+                <a:extLst>
+                  <a:ext uri="{FF2B5EF4-FFF2-40B4-BE49-F238E27FC236}">
+                    <a16:creationId xmlns:a16="http://schemas.microsoft.com/office/drawing/2014/main" id="{44A262F3-984D-4FAF-A773-88B1BD6E2480}"/>
+                  </a:ext>
+                </a:extLst>
+              </p:cNvPr>
+              <p:cNvSpPr txBox="1"/>
+              <p:nvPr/>
+            </p:nvSpPr>
+            <p:spPr>
+              <a:xfrm>
+                <a:off x="2957993" y="3459773"/>
+                <a:ext cx="288477" cy="276999"/>
+              </a:xfrm>
+              <a:prstGeom prst="rect">
+                <a:avLst/>
+              </a:prstGeom>
+              <a:noFill/>
+            </p:spPr>
+            <p:txBody>
+              <a:bodyPr wrap="none" lIns="0" tIns="0" rIns="0" bIns="0" rtlCol="0">
+                <a:spAutoFit/>
+              </a:bodyPr>
+              <a:lstStyle/>
+              <a:p>
+                <a:pPr/>
+                <a14:m>
+                  <m:oMathPara xmlns:m="http://schemas.openxmlformats.org/officeDocument/2006/math">
+                    <m:oMathParaPr>
+                      <m:jc m:val="centerGroup"/>
+                    </m:oMathParaPr>
+                    <m:oMath xmlns:m="http://schemas.openxmlformats.org/officeDocument/2006/math">
+                      <m:sSub>
+                        <m:sSubPr>
+                          <m:ctrlPr>
+                            <a:rPr lang="en-CA" b="0" i="1" smtClean="0">
+                              <a:latin typeface="Cambria Math" panose="02040503050406030204" pitchFamily="18" charset="0"/>
+                            </a:rPr>
+                          </m:ctrlPr>
+                        </m:sSubPr>
+                        <m:e>
+                          <m:r>
+                            <a:rPr lang="en-CA" b="0" i="1" smtClean="0">
+                              <a:latin typeface="Cambria Math" panose="02040503050406030204" pitchFamily="18" charset="0"/>
+                            </a:rPr>
+                            <m:t>𝑎</m:t>
+                          </m:r>
+                        </m:e>
+                        <m:sub>
+                          <m:r>
+                            <a:rPr lang="en-CA" b="0" i="1" smtClean="0">
+                              <a:latin typeface="Cambria Math" panose="02040503050406030204" pitchFamily="18" charset="0"/>
+                            </a:rPr>
+                            <m:t>2</m:t>
+                          </m:r>
+                        </m:sub>
+                      </m:sSub>
+                    </m:oMath>
+                  </m:oMathPara>
+                </a14:m>
+                <a:endParaRPr lang="en-CA" b="0" dirty="0"/>
+              </a:p>
+            </p:txBody>
+          </p:sp>
+        </mc:Choice>
+        <mc:Fallback xmlns="">
+          <p:sp>
+            <p:nvSpPr>
+              <p:cNvPr id="41" name="TextBox 40">
+                <a:extLst>
+                  <a:ext uri="{FF2B5EF4-FFF2-40B4-BE49-F238E27FC236}">
+                    <a16:creationId xmlns:a16="http://schemas.microsoft.com/office/drawing/2014/main" id="{44A262F3-984D-4FAF-A773-88B1BD6E2480}"/>
+                  </a:ext>
+                </a:extLst>
+              </p:cNvPr>
+              <p:cNvSpPr txBox="1">
+                <a:spLocks noRot="1" noChangeAspect="1" noMove="1" noResize="1" noEditPoints="1" noAdjustHandles="1" noChangeArrowheads="1" noChangeShapeType="1" noTextEdit="1"/>
+              </p:cNvSpPr>
+              <p:nvPr/>
+            </p:nvSpPr>
+            <p:spPr>
+              <a:xfrm>
+                <a:off x="2957993" y="3459773"/>
+                <a:ext cx="288477" cy="276999"/>
+              </a:xfrm>
+              <a:prstGeom prst="rect">
+                <a:avLst/>
+              </a:prstGeom>
+              <a:blipFill>
+                <a:blip r:embed="rId13"/>
+                <a:stretch>
+                  <a:fillRect l="-12500" r="-6250" b="-15556"/>
+                </a:stretch>
+              </a:blipFill>
+            </p:spPr>
+            <p:txBody>
+              <a:bodyPr/>
+              <a:lstStyle/>
+              <a:p>
+                <a:r>
+                  <a:rPr lang="en-CA">
+                    <a:noFill/>
+                  </a:rPr>
+                  <a:t> </a:t>
+                </a:r>
+              </a:p>
+            </p:txBody>
+          </p:sp>
+        </mc:Fallback>
+      </mc:AlternateContent>
+      <mc:AlternateContent xmlns:mc="http://schemas.openxmlformats.org/markup-compatibility/2006" xmlns:a14="http://schemas.microsoft.com/office/drawing/2010/main">
+        <mc:Choice Requires="a14">
+          <p:sp>
+            <p:nvSpPr>
+              <p:cNvPr id="42" name="TextBox 41">
+                <a:extLst>
+                  <a:ext uri="{FF2B5EF4-FFF2-40B4-BE49-F238E27FC236}">
+                    <a16:creationId xmlns:a16="http://schemas.microsoft.com/office/drawing/2014/main" id="{6FA64D7A-7578-4104-9BF0-2DA70B0172D1}"/>
+                  </a:ext>
+                </a:extLst>
+              </p:cNvPr>
+              <p:cNvSpPr txBox="1"/>
+              <p:nvPr/>
+            </p:nvSpPr>
+            <p:spPr>
+              <a:xfrm>
+                <a:off x="2941610" y="4926714"/>
+                <a:ext cx="321242" cy="276999"/>
+              </a:xfrm>
+              <a:prstGeom prst="rect">
+                <a:avLst/>
+              </a:prstGeom>
+              <a:noFill/>
+            </p:spPr>
+            <p:txBody>
+              <a:bodyPr wrap="none" lIns="0" tIns="0" rIns="0" bIns="0" rtlCol="0">
+                <a:spAutoFit/>
+              </a:bodyPr>
+              <a:lstStyle/>
+              <a:p>
+                <a:pPr/>
+                <a14:m>
+                  <m:oMathPara xmlns:m="http://schemas.openxmlformats.org/officeDocument/2006/math">
+                    <m:oMathParaPr>
+                      <m:jc m:val="centerGroup"/>
+                    </m:oMathParaPr>
+                    <m:oMath xmlns:m="http://schemas.openxmlformats.org/officeDocument/2006/math">
+                      <m:sSub>
+                        <m:sSubPr>
+                          <m:ctrlPr>
+                            <a:rPr lang="en-CA" b="0" i="1" smtClean="0">
+                              <a:latin typeface="Cambria Math" panose="02040503050406030204" pitchFamily="18" charset="0"/>
+                            </a:rPr>
+                          </m:ctrlPr>
+                        </m:sSubPr>
+                        <m:e>
+                          <m:r>
+                            <a:rPr lang="en-CA" b="0" i="1" smtClean="0">
+                              <a:latin typeface="Cambria Math" panose="02040503050406030204" pitchFamily="18" charset="0"/>
+                            </a:rPr>
+                            <m:t>𝑎</m:t>
+                          </m:r>
+                        </m:e>
+                        <m:sub>
+                          <m:r>
+                            <a:rPr lang="en-CA" b="0" i="1" smtClean="0">
+                              <a:latin typeface="Cambria Math" panose="02040503050406030204" pitchFamily="18" charset="0"/>
+                            </a:rPr>
+                            <m:t>𝑁</m:t>
+                          </m:r>
+                        </m:sub>
+                      </m:sSub>
+                    </m:oMath>
+                  </m:oMathPara>
+                </a14:m>
+                <a:endParaRPr lang="en-CA" b="0" dirty="0"/>
+              </a:p>
+            </p:txBody>
+          </p:sp>
+        </mc:Choice>
+        <mc:Fallback xmlns="">
+          <p:sp>
+            <p:nvSpPr>
+              <p:cNvPr id="42" name="TextBox 41">
+                <a:extLst>
+                  <a:ext uri="{FF2B5EF4-FFF2-40B4-BE49-F238E27FC236}">
+                    <a16:creationId xmlns:a16="http://schemas.microsoft.com/office/drawing/2014/main" id="{6FA64D7A-7578-4104-9BF0-2DA70B0172D1}"/>
+                  </a:ext>
+                </a:extLst>
+              </p:cNvPr>
+              <p:cNvSpPr txBox="1">
+                <a:spLocks noRot="1" noChangeAspect="1" noMove="1" noResize="1" noEditPoints="1" noAdjustHandles="1" noChangeArrowheads="1" noChangeShapeType="1" noTextEdit="1"/>
+              </p:cNvSpPr>
+              <p:nvPr/>
+            </p:nvSpPr>
+            <p:spPr>
+              <a:xfrm>
+                <a:off x="2941610" y="4926714"/>
+                <a:ext cx="321242" cy="276999"/>
+              </a:xfrm>
+              <a:prstGeom prst="rect">
+                <a:avLst/>
+              </a:prstGeom>
+              <a:blipFill>
+                <a:blip r:embed="rId14"/>
+                <a:stretch>
+                  <a:fillRect l="-9615" r="-7692" b="-15217"/>
+                </a:stretch>
+              </a:blipFill>
+            </p:spPr>
+            <p:txBody>
+              <a:bodyPr/>
+              <a:lstStyle/>
+              <a:p>
+                <a:r>
+                  <a:rPr lang="en-CA">
+                    <a:noFill/>
+                  </a:rPr>
+                  <a:t> </a:t>
+                </a:r>
+              </a:p>
+            </p:txBody>
+          </p:sp>
+        </mc:Fallback>
+      </mc:AlternateContent>
+      <mc:AlternateContent xmlns:mc="http://schemas.openxmlformats.org/markup-compatibility/2006" xmlns:a14="http://schemas.microsoft.com/office/drawing/2010/main">
+        <mc:Choice Requires="a14">
+          <p:sp>
+            <p:nvSpPr>
+              <p:cNvPr id="44" name="TextBox 43">
+                <a:extLst>
+                  <a:ext uri="{FF2B5EF4-FFF2-40B4-BE49-F238E27FC236}">
+                    <a16:creationId xmlns:a16="http://schemas.microsoft.com/office/drawing/2014/main" id="{CD322987-D1F5-45AF-870D-356D719142F1}"/>
+                  </a:ext>
+                </a:extLst>
+              </p:cNvPr>
+              <p:cNvSpPr txBox="1"/>
+              <p:nvPr/>
+            </p:nvSpPr>
+            <p:spPr>
+              <a:xfrm>
+                <a:off x="7312957" y="2225335"/>
+                <a:ext cx="272639" cy="276999"/>
+              </a:xfrm>
+              <a:prstGeom prst="rect">
+                <a:avLst/>
+              </a:prstGeom>
+              <a:noFill/>
+            </p:spPr>
+            <p:txBody>
+              <a:bodyPr wrap="none" lIns="0" tIns="0" rIns="0" bIns="0" rtlCol="0">
+                <a:spAutoFit/>
+              </a:bodyPr>
+              <a:lstStyle/>
+              <a:p>
+                <a:pPr/>
+                <a14:m>
+                  <m:oMathPara xmlns:m="http://schemas.openxmlformats.org/officeDocument/2006/math">
+                    <m:oMathParaPr>
+                      <m:jc m:val="centerGroup"/>
+                    </m:oMathParaPr>
+                    <m:oMath xmlns:m="http://schemas.openxmlformats.org/officeDocument/2006/math">
+                      <m:sSub>
+                        <m:sSubPr>
+                          <m:ctrlPr>
+                            <a:rPr lang="en-CA" b="0" i="1" smtClean="0">
+                              <a:latin typeface="Cambria Math" panose="02040503050406030204" pitchFamily="18" charset="0"/>
+                            </a:rPr>
+                          </m:ctrlPr>
+                        </m:sSubPr>
+                        <m:e>
+                          <m:r>
+                            <a:rPr lang="en-CA" b="0" i="1" smtClean="0">
+                              <a:latin typeface="Cambria Math" panose="02040503050406030204" pitchFamily="18" charset="0"/>
+                            </a:rPr>
+                            <m:t>𝑏</m:t>
+                          </m:r>
+                        </m:e>
+                        <m:sub>
+                          <m:r>
+                            <a:rPr lang="en-CA" b="0" i="1" smtClean="0">
+                              <a:latin typeface="Cambria Math" panose="02040503050406030204" pitchFamily="18" charset="0"/>
+                            </a:rPr>
+                            <m:t>1</m:t>
+                          </m:r>
+                        </m:sub>
+                      </m:sSub>
+                    </m:oMath>
+                  </m:oMathPara>
+                </a14:m>
+                <a:endParaRPr lang="en-CA" b="0" dirty="0"/>
+              </a:p>
+            </p:txBody>
+          </p:sp>
+        </mc:Choice>
+        <mc:Fallback xmlns="">
+          <p:sp>
+            <p:nvSpPr>
+              <p:cNvPr id="44" name="TextBox 43">
+                <a:extLst>
+                  <a:ext uri="{FF2B5EF4-FFF2-40B4-BE49-F238E27FC236}">
+                    <a16:creationId xmlns:a16="http://schemas.microsoft.com/office/drawing/2014/main" id="{CD322987-D1F5-45AF-870D-356D719142F1}"/>
+                  </a:ext>
+                </a:extLst>
+              </p:cNvPr>
+              <p:cNvSpPr txBox="1">
+                <a:spLocks noRot="1" noChangeAspect="1" noMove="1" noResize="1" noEditPoints="1" noAdjustHandles="1" noChangeArrowheads="1" noChangeShapeType="1" noTextEdit="1"/>
+              </p:cNvSpPr>
+              <p:nvPr/>
+            </p:nvSpPr>
+            <p:spPr>
+              <a:xfrm>
+                <a:off x="7312957" y="2225335"/>
+                <a:ext cx="272639" cy="276999"/>
+              </a:xfrm>
+              <a:prstGeom prst="rect">
+                <a:avLst/>
+              </a:prstGeom>
+              <a:blipFill>
+                <a:blip r:embed="rId15"/>
+                <a:stretch>
+                  <a:fillRect l="-22727" r="-6818" b="-17778"/>
+                </a:stretch>
+              </a:blipFill>
+            </p:spPr>
+            <p:txBody>
+              <a:bodyPr/>
+              <a:lstStyle/>
+              <a:p>
+                <a:r>
+                  <a:rPr lang="en-CA">
+                    <a:noFill/>
+                  </a:rPr>
+                  <a:t> </a:t>
+                </a:r>
+              </a:p>
+            </p:txBody>
+          </p:sp>
+        </mc:Fallback>
+      </mc:AlternateContent>
+      <mc:AlternateContent xmlns:mc="http://schemas.openxmlformats.org/markup-compatibility/2006" xmlns:a14="http://schemas.microsoft.com/office/drawing/2010/main">
+        <mc:Choice Requires="a14">
+          <p:sp>
+            <p:nvSpPr>
+              <p:cNvPr id="53" name="TextBox 52">
+                <a:extLst>
+                  <a:ext uri="{FF2B5EF4-FFF2-40B4-BE49-F238E27FC236}">
+                    <a16:creationId xmlns:a16="http://schemas.microsoft.com/office/drawing/2014/main" id="{CAE14E5A-C95A-4283-A90C-5C858FBE2A6F}"/>
+                  </a:ext>
+                </a:extLst>
+              </p:cNvPr>
+              <p:cNvSpPr txBox="1"/>
+              <p:nvPr/>
+            </p:nvSpPr>
+            <p:spPr>
+              <a:xfrm>
+                <a:off x="7331107" y="2814465"/>
+                <a:ext cx="277961" cy="276999"/>
+              </a:xfrm>
+              <a:prstGeom prst="rect">
+                <a:avLst/>
+              </a:prstGeom>
+              <a:noFill/>
+            </p:spPr>
+            <p:txBody>
+              <a:bodyPr wrap="none" lIns="0" tIns="0" rIns="0" bIns="0" rtlCol="0">
+                <a:spAutoFit/>
+              </a:bodyPr>
+              <a:lstStyle/>
+              <a:p>
+                <a:pPr/>
+                <a14:m>
+                  <m:oMathPara xmlns:m="http://schemas.openxmlformats.org/officeDocument/2006/math">
+                    <m:oMathParaPr>
+                      <m:jc m:val="centerGroup"/>
+                    </m:oMathParaPr>
+                    <m:oMath xmlns:m="http://schemas.openxmlformats.org/officeDocument/2006/math">
+                      <m:sSub>
+                        <m:sSubPr>
+                          <m:ctrlPr>
+                            <a:rPr lang="en-CA" b="0" i="1" smtClean="0">
+                              <a:latin typeface="Cambria Math" panose="02040503050406030204" pitchFamily="18" charset="0"/>
+                            </a:rPr>
+                          </m:ctrlPr>
+                        </m:sSubPr>
+                        <m:e>
+                          <m:r>
+                            <a:rPr lang="en-CA" b="0" i="1" smtClean="0">
+                              <a:latin typeface="Cambria Math" panose="02040503050406030204" pitchFamily="18" charset="0"/>
+                            </a:rPr>
+                            <m:t>𝑏</m:t>
+                          </m:r>
+                        </m:e>
+                        <m:sub>
+                          <m:r>
+                            <a:rPr lang="en-CA" b="0" i="1" smtClean="0">
+                              <a:latin typeface="Cambria Math" panose="02040503050406030204" pitchFamily="18" charset="0"/>
+                            </a:rPr>
+                            <m:t>2</m:t>
+                          </m:r>
+                        </m:sub>
+                      </m:sSub>
+                    </m:oMath>
+                  </m:oMathPara>
+                </a14:m>
+                <a:endParaRPr lang="en-CA" b="0" dirty="0"/>
+              </a:p>
+            </p:txBody>
+          </p:sp>
+        </mc:Choice>
+        <mc:Fallback xmlns="">
+          <p:sp>
+            <p:nvSpPr>
+              <p:cNvPr id="53" name="TextBox 52">
+                <a:extLst>
+                  <a:ext uri="{FF2B5EF4-FFF2-40B4-BE49-F238E27FC236}">
+                    <a16:creationId xmlns:a16="http://schemas.microsoft.com/office/drawing/2014/main" id="{CAE14E5A-C95A-4283-A90C-5C858FBE2A6F}"/>
+                  </a:ext>
+                </a:extLst>
+              </p:cNvPr>
+              <p:cNvSpPr txBox="1">
+                <a:spLocks noRot="1" noChangeAspect="1" noMove="1" noResize="1" noEditPoints="1" noAdjustHandles="1" noChangeArrowheads="1" noChangeShapeType="1" noTextEdit="1"/>
+              </p:cNvSpPr>
+              <p:nvPr/>
+            </p:nvSpPr>
+            <p:spPr>
+              <a:xfrm>
+                <a:off x="7331107" y="2814465"/>
+                <a:ext cx="277961" cy="276999"/>
+              </a:xfrm>
+              <a:prstGeom prst="rect">
+                <a:avLst/>
+              </a:prstGeom>
+              <a:blipFill>
+                <a:blip r:embed="rId16"/>
+                <a:stretch>
+                  <a:fillRect l="-20000" r="-8889" b="-15556"/>
+                </a:stretch>
+              </a:blipFill>
+            </p:spPr>
+            <p:txBody>
+              <a:bodyPr/>
+              <a:lstStyle/>
+              <a:p>
+                <a:r>
+                  <a:rPr lang="en-CA">
+                    <a:noFill/>
+                  </a:rPr>
+                  <a:t> </a:t>
+                </a:r>
+              </a:p>
+            </p:txBody>
+          </p:sp>
+        </mc:Fallback>
+      </mc:AlternateContent>
+      <mc:AlternateContent xmlns:mc="http://schemas.openxmlformats.org/markup-compatibility/2006" xmlns:a14="http://schemas.microsoft.com/office/drawing/2010/main">
+        <mc:Choice Requires="a14">
+          <p:sp>
+            <p:nvSpPr>
+              <p:cNvPr id="60" name="TextBox 59">
+                <a:extLst>
+                  <a:ext uri="{FF2B5EF4-FFF2-40B4-BE49-F238E27FC236}">
+                    <a16:creationId xmlns:a16="http://schemas.microsoft.com/office/drawing/2014/main" id="{4C94C6E5-36BD-40D5-A24C-441E8CCEAF83}"/>
+                  </a:ext>
+                </a:extLst>
+              </p:cNvPr>
+              <p:cNvSpPr txBox="1"/>
+              <p:nvPr/>
+            </p:nvSpPr>
+            <p:spPr>
+              <a:xfrm>
+                <a:off x="7331107" y="3459773"/>
+                <a:ext cx="277960" cy="276999"/>
+              </a:xfrm>
+              <a:prstGeom prst="rect">
+                <a:avLst/>
+              </a:prstGeom>
+              <a:noFill/>
+            </p:spPr>
+            <p:txBody>
+              <a:bodyPr wrap="none" lIns="0" tIns="0" rIns="0" bIns="0" rtlCol="0">
+                <a:spAutoFit/>
+              </a:bodyPr>
+              <a:lstStyle/>
+              <a:p>
+                <a:pPr/>
+                <a14:m>
+                  <m:oMathPara xmlns:m="http://schemas.openxmlformats.org/officeDocument/2006/math">
+                    <m:oMathParaPr>
+                      <m:jc m:val="centerGroup"/>
+                    </m:oMathParaPr>
+                    <m:oMath xmlns:m="http://schemas.openxmlformats.org/officeDocument/2006/math">
+                      <m:sSub>
+                        <m:sSubPr>
+                          <m:ctrlPr>
+                            <a:rPr lang="en-CA" b="0" i="1" smtClean="0">
+                              <a:latin typeface="Cambria Math" panose="02040503050406030204" pitchFamily="18" charset="0"/>
+                            </a:rPr>
+                          </m:ctrlPr>
+                        </m:sSubPr>
+                        <m:e>
+                          <m:r>
+                            <a:rPr lang="en-CA" b="0" i="1" smtClean="0">
+                              <a:latin typeface="Cambria Math" panose="02040503050406030204" pitchFamily="18" charset="0"/>
+                            </a:rPr>
+                            <m:t>𝑏</m:t>
+                          </m:r>
+                        </m:e>
+                        <m:sub>
+                          <m:r>
+                            <a:rPr lang="en-CA" b="0" i="1" smtClean="0">
+                              <a:latin typeface="Cambria Math" panose="02040503050406030204" pitchFamily="18" charset="0"/>
+                            </a:rPr>
+                            <m:t>3</m:t>
+                          </m:r>
+                        </m:sub>
+                      </m:sSub>
+                    </m:oMath>
+                  </m:oMathPara>
+                </a14:m>
+                <a:endParaRPr lang="en-CA" b="0" dirty="0"/>
+              </a:p>
+            </p:txBody>
+          </p:sp>
+        </mc:Choice>
+        <mc:Fallback xmlns="">
+          <p:sp>
+            <p:nvSpPr>
+              <p:cNvPr id="60" name="TextBox 59">
+                <a:extLst>
+                  <a:ext uri="{FF2B5EF4-FFF2-40B4-BE49-F238E27FC236}">
+                    <a16:creationId xmlns:a16="http://schemas.microsoft.com/office/drawing/2014/main" id="{4C94C6E5-36BD-40D5-A24C-441E8CCEAF83}"/>
+                  </a:ext>
+                </a:extLst>
+              </p:cNvPr>
+              <p:cNvSpPr txBox="1">
+                <a:spLocks noRot="1" noChangeAspect="1" noMove="1" noResize="1" noEditPoints="1" noAdjustHandles="1" noChangeArrowheads="1" noChangeShapeType="1" noTextEdit="1"/>
+              </p:cNvSpPr>
+              <p:nvPr/>
+            </p:nvSpPr>
+            <p:spPr>
+              <a:xfrm>
+                <a:off x="7331107" y="3459773"/>
+                <a:ext cx="277960" cy="276999"/>
+              </a:xfrm>
+              <a:prstGeom prst="rect">
+                <a:avLst/>
+              </a:prstGeom>
+              <a:blipFill>
+                <a:blip r:embed="rId17"/>
+                <a:stretch>
+                  <a:fillRect l="-20000" r="-8889" b="-15556"/>
+                </a:stretch>
+              </a:blipFill>
+            </p:spPr>
+            <p:txBody>
+              <a:bodyPr/>
+              <a:lstStyle/>
+              <a:p>
+                <a:r>
+                  <a:rPr lang="en-CA">
+                    <a:noFill/>
+                  </a:rPr>
+                  <a:t> </a:t>
+                </a:r>
+              </a:p>
+            </p:txBody>
+          </p:sp>
+        </mc:Fallback>
+      </mc:AlternateContent>
+      <mc:AlternateContent xmlns:mc="http://schemas.openxmlformats.org/markup-compatibility/2006">
+        <mc:Choice xmlns:a14="http://schemas.microsoft.com/office/drawing/2010/main" Requires="a14">
+          <p:sp>
+            <p:nvSpPr>
+              <p:cNvPr id="61" name="TextBox 60">
+                <a:extLst>
+                  <a:ext uri="{FF2B5EF4-FFF2-40B4-BE49-F238E27FC236}">
+                    <a16:creationId xmlns:a16="http://schemas.microsoft.com/office/drawing/2014/main" id="{1A1BA1D2-392D-4122-AA15-D38507265522}"/>
+                  </a:ext>
+                </a:extLst>
+              </p:cNvPr>
+              <p:cNvSpPr txBox="1"/>
+              <p:nvPr/>
+            </p:nvSpPr>
+            <p:spPr>
+              <a:xfrm>
+                <a:off x="7314724" y="4926714"/>
+                <a:ext cx="342978" cy="276999"/>
+              </a:xfrm>
+              <a:prstGeom prst="rect">
+                <a:avLst/>
+              </a:prstGeom>
+              <a:noFill/>
+            </p:spPr>
+            <p:txBody>
+              <a:bodyPr wrap="none" lIns="0" tIns="0" rIns="0" bIns="0" rtlCol="0">
+                <a:spAutoFit/>
+              </a:bodyPr>
+              <a:lstStyle/>
+              <a:p>
+                <a:pPr/>
+                <a14:m>
+                  <m:oMathPara xmlns:m="http://schemas.openxmlformats.org/officeDocument/2006/math">
+                    <m:oMathParaPr>
+                      <m:jc m:val="centerGroup"/>
+                    </m:oMathParaPr>
+                    <m:oMath xmlns:m="http://schemas.openxmlformats.org/officeDocument/2006/math">
+                      <m:sSub>
+                        <m:sSubPr>
+                          <m:ctrlPr>
+                            <a:rPr lang="en-CA" b="0" i="1" smtClean="0">
+                              <a:latin typeface="Cambria Math" panose="02040503050406030204" pitchFamily="18" charset="0"/>
+                            </a:rPr>
+                          </m:ctrlPr>
+                        </m:sSubPr>
+                        <m:e>
+                          <m:r>
+                            <a:rPr lang="en-CA" b="0" i="1" smtClean="0">
+                              <a:latin typeface="Cambria Math" panose="02040503050406030204" pitchFamily="18" charset="0"/>
+                            </a:rPr>
+                            <m:t>𝑏</m:t>
+                          </m:r>
+                        </m:e>
+                        <m:sub>
+                          <m:r>
+                            <a:rPr lang="en-CA" b="0" i="1" smtClean="0">
+                              <a:latin typeface="Cambria Math" panose="02040503050406030204" pitchFamily="18" charset="0"/>
+                            </a:rPr>
+                            <m:t>𝑀</m:t>
+                          </m:r>
+                        </m:sub>
+                      </m:sSub>
+                    </m:oMath>
+                  </m:oMathPara>
+                </a14:m>
+                <a:endParaRPr lang="en-CA" b="0" dirty="0"/>
+              </a:p>
+            </p:txBody>
+          </p:sp>
+        </mc:Choice>
+        <mc:Fallback>
+          <p:sp>
+            <p:nvSpPr>
+              <p:cNvPr id="61" name="TextBox 60">
+                <a:extLst>
+                  <a:ext uri="{FF2B5EF4-FFF2-40B4-BE49-F238E27FC236}">
+                    <a16:creationId xmlns:a16="http://schemas.microsoft.com/office/drawing/2014/main" id="{1A1BA1D2-392D-4122-AA15-D38507265522}"/>
+                  </a:ext>
+                </a:extLst>
+              </p:cNvPr>
+              <p:cNvSpPr txBox="1">
+                <a:spLocks noRot="1" noChangeAspect="1" noMove="1" noResize="1" noEditPoints="1" noAdjustHandles="1" noChangeArrowheads="1" noChangeShapeType="1" noTextEdit="1"/>
+              </p:cNvSpPr>
+              <p:nvPr/>
+            </p:nvSpPr>
+            <p:spPr>
+              <a:xfrm>
+                <a:off x="7314724" y="4926714"/>
+                <a:ext cx="342978" cy="276999"/>
+              </a:xfrm>
+              <a:prstGeom prst="rect">
+                <a:avLst/>
+              </a:prstGeom>
+              <a:blipFill>
+                <a:blip r:embed="rId18"/>
+                <a:stretch>
+                  <a:fillRect l="-16071" r="-3571" b="-15217"/>
+                </a:stretch>
+              </a:blipFill>
+            </p:spPr>
+            <p:txBody>
+              <a:bodyPr/>
+              <a:lstStyle/>
+              <a:p>
+                <a:r>
+                  <a:rPr lang="en-CA">
+                    <a:noFill/>
+                  </a:rPr>
+                  <a:t> </a:t>
+                </a:r>
+              </a:p>
+            </p:txBody>
+          </p:sp>
+        </mc:Fallback>
+      </mc:AlternateContent>
     </p:spTree>
     <p:extLst>
       <p:ext uri="{BB962C8B-B14F-4D97-AF65-F5344CB8AC3E}">
         <p14:creationId xmlns:p14="http://schemas.microsoft.com/office/powerpoint/2010/main" val="3363070386"/>
+      </p:ext>
+    </p:extLst>
+  </p:cSld>
+  <p:clrMapOvr>
+    <a:masterClrMapping/>
+  </p:clrMapOvr>
+</p:sld>
+</file>
+
+<file path=ppt/slides/slide2.xml><?xml version="1.0" encoding="utf-8"?>
+<p:sld xmlns:a="http://schemas.openxmlformats.org/drawingml/2006/main" xmlns:r="http://schemas.openxmlformats.org/officeDocument/2006/relationships" xmlns:p="http://schemas.openxmlformats.org/presentationml/2006/main">
+  <p:cSld>
+    <p:spTree>
+      <p:nvGrpSpPr>
+        <p:cNvPr id="1" name=""/>
+        <p:cNvGrpSpPr/>
+        <p:nvPr/>
+      </p:nvGrpSpPr>
+      <p:grpSpPr>
+        <a:xfrm>
+          <a:off x="0" y="0"/>
+          <a:ext cx="0" cy="0"/>
+          <a:chOff x="0" y="0"/>
+          <a:chExt cx="0" cy="0"/>
+        </a:xfrm>
+      </p:grpSpPr>
+      <p:cxnSp>
+        <p:nvCxnSpPr>
+          <p:cNvPr id="21" name="Straight Arrow Connector 20">
+            <a:extLst>
+              <a:ext uri="{FF2B5EF4-FFF2-40B4-BE49-F238E27FC236}">
+                <a16:creationId xmlns:a16="http://schemas.microsoft.com/office/drawing/2014/main" id="{29312D3F-3422-4846-B1B5-1C50DA7652C5}"/>
+              </a:ext>
+            </a:extLst>
+          </p:cNvPr>
+          <p:cNvCxnSpPr>
+            <a:cxnSpLocks/>
+          </p:cNvCxnSpPr>
+          <p:nvPr/>
+        </p:nvCxnSpPr>
+        <p:spPr>
+          <a:xfrm flipV="1">
+            <a:off x="4538212" y="1101437"/>
+            <a:ext cx="0" cy="720000"/>
+          </a:xfrm>
+          <a:prstGeom prst="straightConnector1">
+            <a:avLst/>
+          </a:prstGeom>
+          <a:ln w="57150">
+            <a:solidFill>
+              <a:schemeClr val="tx1"/>
+            </a:solidFill>
+            <a:tailEnd type="triangle"/>
+          </a:ln>
+        </p:spPr>
+        <p:style>
+          <a:lnRef idx="3">
+            <a:schemeClr val="dk1"/>
+          </a:lnRef>
+          <a:fillRef idx="0">
+            <a:schemeClr val="dk1"/>
+          </a:fillRef>
+          <a:effectRef idx="2">
+            <a:schemeClr val="dk1"/>
+          </a:effectRef>
+          <a:fontRef idx="minor">
+            <a:schemeClr val="tx1"/>
+          </a:fontRef>
+        </p:style>
+      </p:cxnSp>
+      <p:cxnSp>
+        <p:nvCxnSpPr>
+          <p:cNvPr id="29" name="Straight Arrow Connector 28">
+            <a:extLst>
+              <a:ext uri="{FF2B5EF4-FFF2-40B4-BE49-F238E27FC236}">
+                <a16:creationId xmlns:a16="http://schemas.microsoft.com/office/drawing/2014/main" id="{EDA9B620-E22E-489A-ACCC-771D3C932D76}"/>
+              </a:ext>
+            </a:extLst>
+          </p:cNvPr>
+          <p:cNvCxnSpPr>
+            <a:cxnSpLocks/>
+          </p:cNvCxnSpPr>
+          <p:nvPr/>
+        </p:nvCxnSpPr>
+        <p:spPr>
+          <a:xfrm flipV="1">
+            <a:off x="3009900" y="2292929"/>
+            <a:ext cx="0" cy="720000"/>
+          </a:xfrm>
+          <a:prstGeom prst="straightConnector1">
+            <a:avLst/>
+          </a:prstGeom>
+          <a:ln w="57150">
+            <a:solidFill>
+              <a:schemeClr val="tx1"/>
+            </a:solidFill>
+            <a:tailEnd type="triangle"/>
+          </a:ln>
+        </p:spPr>
+        <p:style>
+          <a:lnRef idx="3">
+            <a:schemeClr val="dk1"/>
+          </a:lnRef>
+          <a:fillRef idx="0">
+            <a:schemeClr val="dk1"/>
+          </a:fillRef>
+          <a:effectRef idx="2">
+            <a:schemeClr val="dk1"/>
+          </a:effectRef>
+          <a:fontRef idx="minor">
+            <a:schemeClr val="tx1"/>
+          </a:fontRef>
+        </p:style>
+      </p:cxnSp>
+      <p:cxnSp>
+        <p:nvCxnSpPr>
+          <p:cNvPr id="31" name="Straight Connector 30">
+            <a:extLst>
+              <a:ext uri="{FF2B5EF4-FFF2-40B4-BE49-F238E27FC236}">
+                <a16:creationId xmlns:a16="http://schemas.microsoft.com/office/drawing/2014/main" id="{4715E9C4-9250-4B1F-BE63-5A962F04B9D1}"/>
+              </a:ext>
+            </a:extLst>
+          </p:cNvPr>
+          <p:cNvCxnSpPr/>
+          <p:nvPr/>
+        </p:nvCxnSpPr>
+        <p:spPr>
+          <a:xfrm flipH="1">
+            <a:off x="3314700" y="1636568"/>
+            <a:ext cx="1002723" cy="1016361"/>
+          </a:xfrm>
+          <a:prstGeom prst="line">
+            <a:avLst/>
+          </a:prstGeom>
+          <a:ln w="9525">
+            <a:solidFill>
+              <a:srgbClr val="FF0000"/>
+            </a:solidFill>
+          </a:ln>
+        </p:spPr>
+        <p:style>
+          <a:lnRef idx="2">
+            <a:schemeClr val="accent2"/>
+          </a:lnRef>
+          <a:fillRef idx="0">
+            <a:schemeClr val="accent2"/>
+          </a:fillRef>
+          <a:effectRef idx="1">
+            <a:schemeClr val="accent2"/>
+          </a:effectRef>
+          <a:fontRef idx="minor">
+            <a:schemeClr val="tx1"/>
+          </a:fontRef>
+        </p:style>
+      </p:cxnSp>
+      <p:pic>
+        <p:nvPicPr>
+          <p:cNvPr id="32" name="Picture 31">
+            <a:extLst>
+              <a:ext uri="{FF2B5EF4-FFF2-40B4-BE49-F238E27FC236}">
+                <a16:creationId xmlns:a16="http://schemas.microsoft.com/office/drawing/2014/main" id="{3E78393A-6FA4-41A2-A264-4C74F90C9BCE}"/>
+              </a:ext>
+            </a:extLst>
+          </p:cNvPr>
+          <p:cNvPicPr>
+            <a:picLocks noChangeAspect="1"/>
+          </p:cNvPicPr>
+          <p:nvPr/>
+        </p:nvPicPr>
+        <p:blipFill>
+          <a:blip r:embed="rId2"/>
+          <a:stretch>
+            <a:fillRect/>
+          </a:stretch>
+        </p:blipFill>
+        <p:spPr>
+          <a:xfrm>
+            <a:off x="6461884" y="3538104"/>
+            <a:ext cx="5730115" cy="1708689"/>
+          </a:xfrm>
+          <a:prstGeom prst="rect">
+            <a:avLst/>
+          </a:prstGeom>
+        </p:spPr>
+      </p:pic>
+      <p:pic>
+        <p:nvPicPr>
+          <p:cNvPr id="33" name="Picture 32">
+            <a:extLst>
+              <a:ext uri="{FF2B5EF4-FFF2-40B4-BE49-F238E27FC236}">
+                <a16:creationId xmlns:a16="http://schemas.microsoft.com/office/drawing/2014/main" id="{E34CF222-3EBD-4E2A-9850-2CB52C36EB34}"/>
+              </a:ext>
+            </a:extLst>
+          </p:cNvPr>
+          <p:cNvPicPr>
+            <a:picLocks noChangeAspect="1"/>
+          </p:cNvPicPr>
+          <p:nvPr/>
+        </p:nvPicPr>
+        <p:blipFill>
+          <a:blip r:embed="rId3"/>
+          <a:stretch>
+            <a:fillRect/>
+          </a:stretch>
+        </p:blipFill>
+        <p:spPr>
+          <a:xfrm>
+            <a:off x="4741543" y="1041036"/>
+            <a:ext cx="299368" cy="360000"/>
+          </a:xfrm>
+          <a:prstGeom prst="rect">
+            <a:avLst/>
+          </a:prstGeom>
+        </p:spPr>
+      </p:pic>
+      <p:pic>
+        <p:nvPicPr>
+          <p:cNvPr id="34" name="Picture 33">
+            <a:extLst>
+              <a:ext uri="{FF2B5EF4-FFF2-40B4-BE49-F238E27FC236}">
+                <a16:creationId xmlns:a16="http://schemas.microsoft.com/office/drawing/2014/main" id="{4B8025D6-0ED1-41B9-8E0D-7E5ADBE68907}"/>
+              </a:ext>
+            </a:extLst>
+          </p:cNvPr>
+          <p:cNvPicPr>
+            <a:picLocks noChangeAspect="1"/>
+          </p:cNvPicPr>
+          <p:nvPr/>
+        </p:nvPicPr>
+        <p:blipFill>
+          <a:blip r:embed="rId4"/>
+          <a:stretch>
+            <a:fillRect/>
+          </a:stretch>
+        </p:blipFill>
+        <p:spPr>
+          <a:xfrm>
+            <a:off x="3314700" y="1734306"/>
+            <a:ext cx="419348" cy="389395"/>
+          </a:xfrm>
+          <a:prstGeom prst="rect">
+            <a:avLst/>
+          </a:prstGeom>
+        </p:spPr>
+      </p:pic>
+      <p:pic>
+        <p:nvPicPr>
+          <p:cNvPr id="35" name="Picture 34">
+            <a:extLst>
+              <a:ext uri="{FF2B5EF4-FFF2-40B4-BE49-F238E27FC236}">
+                <a16:creationId xmlns:a16="http://schemas.microsoft.com/office/drawing/2014/main" id="{ADAD9CAA-30A1-4A15-89D0-F6BF92E861EA}"/>
+              </a:ext>
+            </a:extLst>
+          </p:cNvPr>
+          <p:cNvPicPr>
+            <a:picLocks noChangeAspect="1"/>
+          </p:cNvPicPr>
+          <p:nvPr/>
+        </p:nvPicPr>
+        <p:blipFill>
+          <a:blip r:embed="rId5"/>
+          <a:stretch>
+            <a:fillRect/>
+          </a:stretch>
+        </p:blipFill>
+        <p:spPr>
+          <a:xfrm>
+            <a:off x="3734048" y="2237320"/>
+            <a:ext cx="425108" cy="301989"/>
+          </a:xfrm>
+          <a:prstGeom prst="rect">
+            <a:avLst/>
+          </a:prstGeom>
+        </p:spPr>
+      </p:pic>
+      <p:pic>
+        <p:nvPicPr>
+          <p:cNvPr id="36" name="Picture 35">
+            <a:extLst>
+              <a:ext uri="{FF2B5EF4-FFF2-40B4-BE49-F238E27FC236}">
+                <a16:creationId xmlns:a16="http://schemas.microsoft.com/office/drawing/2014/main" id="{9FFA9414-C0BF-4C1D-A1A1-FEE1CFEB340D}"/>
+              </a:ext>
+            </a:extLst>
+          </p:cNvPr>
+          <p:cNvPicPr>
+            <a:picLocks noChangeAspect="1"/>
+          </p:cNvPicPr>
+          <p:nvPr/>
+        </p:nvPicPr>
+        <p:blipFill>
+          <a:blip r:embed="rId6"/>
+          <a:stretch>
+            <a:fillRect/>
+          </a:stretch>
+        </p:blipFill>
+        <p:spPr>
+          <a:xfrm>
+            <a:off x="4871981" y="2237320"/>
+            <a:ext cx="355820" cy="294553"/>
+          </a:xfrm>
+          <a:prstGeom prst="rect">
+            <a:avLst/>
+          </a:prstGeom>
+        </p:spPr>
+      </p:pic>
+      <p:pic>
+        <p:nvPicPr>
+          <p:cNvPr id="37" name="Picture 36">
+            <a:extLst>
+              <a:ext uri="{FF2B5EF4-FFF2-40B4-BE49-F238E27FC236}">
+                <a16:creationId xmlns:a16="http://schemas.microsoft.com/office/drawing/2014/main" id="{A474069F-78E6-4947-A6AF-CA27E5623D25}"/>
+              </a:ext>
+            </a:extLst>
+          </p:cNvPr>
+          <p:cNvPicPr>
+            <a:picLocks noChangeAspect="1"/>
+          </p:cNvPicPr>
+          <p:nvPr/>
+        </p:nvPicPr>
+        <p:blipFill>
+          <a:blip r:embed="rId7"/>
+          <a:stretch>
+            <a:fillRect/>
+          </a:stretch>
+        </p:blipFill>
+        <p:spPr>
+          <a:xfrm>
+            <a:off x="5293915" y="1783080"/>
+            <a:ext cx="360000" cy="331391"/>
+          </a:xfrm>
+          <a:prstGeom prst="rect">
+            <a:avLst/>
+          </a:prstGeom>
+        </p:spPr>
+      </p:pic>
+      <p:cxnSp>
+        <p:nvCxnSpPr>
+          <p:cNvPr id="38" name="Straight Arrow Connector 37">
+            <a:extLst>
+              <a:ext uri="{FF2B5EF4-FFF2-40B4-BE49-F238E27FC236}">
+                <a16:creationId xmlns:a16="http://schemas.microsoft.com/office/drawing/2014/main" id="{4E5AF079-5FDD-4CD1-85A4-41FAEF238A6E}"/>
+              </a:ext>
+            </a:extLst>
+          </p:cNvPr>
+          <p:cNvCxnSpPr>
+            <a:cxnSpLocks/>
+          </p:cNvCxnSpPr>
+          <p:nvPr/>
+        </p:nvCxnSpPr>
+        <p:spPr>
+          <a:xfrm flipV="1">
+            <a:off x="3774056" y="3112682"/>
+            <a:ext cx="0" cy="720000"/>
+          </a:xfrm>
+          <a:prstGeom prst="straightConnector1">
+            <a:avLst/>
+          </a:prstGeom>
+          <a:ln w="57150">
+            <a:solidFill>
+              <a:schemeClr val="tx1"/>
+            </a:solidFill>
+            <a:tailEnd type="triangle"/>
+          </a:ln>
+        </p:spPr>
+        <p:style>
+          <a:lnRef idx="3">
+            <a:schemeClr val="dk1"/>
+          </a:lnRef>
+          <a:fillRef idx="0">
+            <a:schemeClr val="dk1"/>
+          </a:fillRef>
+          <a:effectRef idx="2">
+            <a:schemeClr val="dk1"/>
+          </a:effectRef>
+          <a:fontRef idx="minor">
+            <a:schemeClr val="tx1"/>
+          </a:fontRef>
+        </p:style>
+      </p:cxnSp>
+      <p:cxnSp>
+        <p:nvCxnSpPr>
+          <p:cNvPr id="39" name="Straight Arrow Connector 38">
+            <a:extLst>
+              <a:ext uri="{FF2B5EF4-FFF2-40B4-BE49-F238E27FC236}">
+                <a16:creationId xmlns:a16="http://schemas.microsoft.com/office/drawing/2014/main" id="{F8F11CBF-3312-4982-84AA-63300582C18B}"/>
+              </a:ext>
+            </a:extLst>
+          </p:cNvPr>
+          <p:cNvCxnSpPr>
+            <a:cxnSpLocks/>
+          </p:cNvCxnSpPr>
+          <p:nvPr/>
+        </p:nvCxnSpPr>
+        <p:spPr>
+          <a:xfrm flipV="1">
+            <a:off x="5302369" y="3112682"/>
+            <a:ext cx="0" cy="720000"/>
+          </a:xfrm>
+          <a:prstGeom prst="straightConnector1">
+            <a:avLst/>
+          </a:prstGeom>
+          <a:ln w="57150">
+            <a:solidFill>
+              <a:schemeClr val="tx1"/>
+            </a:solidFill>
+            <a:tailEnd type="triangle"/>
+          </a:ln>
+        </p:spPr>
+        <p:style>
+          <a:lnRef idx="3">
+            <a:schemeClr val="dk1"/>
+          </a:lnRef>
+          <a:fillRef idx="0">
+            <a:schemeClr val="dk1"/>
+          </a:fillRef>
+          <a:effectRef idx="2">
+            <a:schemeClr val="dk1"/>
+          </a:effectRef>
+          <a:fontRef idx="minor">
+            <a:schemeClr val="tx1"/>
+          </a:fontRef>
+        </p:style>
+      </p:cxnSp>
+      <p:cxnSp>
+        <p:nvCxnSpPr>
+          <p:cNvPr id="40" name="Straight Arrow Connector 39">
+            <a:extLst>
+              <a:ext uri="{FF2B5EF4-FFF2-40B4-BE49-F238E27FC236}">
+                <a16:creationId xmlns:a16="http://schemas.microsoft.com/office/drawing/2014/main" id="{7E31A4AB-C7BD-44FC-88C9-E196B7A1A3F3}"/>
+              </a:ext>
+            </a:extLst>
+          </p:cNvPr>
+          <p:cNvCxnSpPr>
+            <a:cxnSpLocks/>
+          </p:cNvCxnSpPr>
+          <p:nvPr/>
+        </p:nvCxnSpPr>
+        <p:spPr>
+          <a:xfrm flipV="1">
+            <a:off x="6066526" y="2292929"/>
+            <a:ext cx="0" cy="720000"/>
+          </a:xfrm>
+          <a:prstGeom prst="straightConnector1">
+            <a:avLst/>
+          </a:prstGeom>
+          <a:ln w="57150">
+            <a:solidFill>
+              <a:schemeClr val="tx1"/>
+            </a:solidFill>
+            <a:tailEnd type="triangle"/>
+          </a:ln>
+        </p:spPr>
+        <p:style>
+          <a:lnRef idx="3">
+            <a:schemeClr val="dk1"/>
+          </a:lnRef>
+          <a:fillRef idx="0">
+            <a:schemeClr val="dk1"/>
+          </a:fillRef>
+          <a:effectRef idx="2">
+            <a:schemeClr val="dk1"/>
+          </a:effectRef>
+          <a:fontRef idx="minor">
+            <a:schemeClr val="tx1"/>
+          </a:fontRef>
+        </p:style>
+      </p:cxnSp>
+      <p:cxnSp>
+        <p:nvCxnSpPr>
+          <p:cNvPr id="43" name="Straight Connector 42">
+            <a:extLst>
+              <a:ext uri="{FF2B5EF4-FFF2-40B4-BE49-F238E27FC236}">
+                <a16:creationId xmlns:a16="http://schemas.microsoft.com/office/drawing/2014/main" id="{D50FE6BD-49F5-482D-A467-ABA78380840E}"/>
+              </a:ext>
+            </a:extLst>
+          </p:cNvPr>
+          <p:cNvCxnSpPr>
+            <a:cxnSpLocks/>
+          </p:cNvCxnSpPr>
+          <p:nvPr/>
+        </p:nvCxnSpPr>
+        <p:spPr>
+          <a:xfrm>
+            <a:off x="4736590" y="1636568"/>
+            <a:ext cx="1004400" cy="1015200"/>
+          </a:xfrm>
+          <a:prstGeom prst="line">
+            <a:avLst/>
+          </a:prstGeom>
+          <a:ln w="9525">
+            <a:solidFill>
+              <a:srgbClr val="FF0000"/>
+            </a:solidFill>
+          </a:ln>
+        </p:spPr>
+        <p:style>
+          <a:lnRef idx="2">
+            <a:schemeClr val="accent2"/>
+          </a:lnRef>
+          <a:fillRef idx="0">
+            <a:schemeClr val="accent2"/>
+          </a:fillRef>
+          <a:effectRef idx="1">
+            <a:schemeClr val="accent2"/>
+          </a:effectRef>
+          <a:fontRef idx="minor">
+            <a:schemeClr val="tx1"/>
+          </a:fontRef>
+        </p:style>
+      </p:cxnSp>
+      <p:cxnSp>
+        <p:nvCxnSpPr>
+          <p:cNvPr id="45" name="Straight Connector 44">
+            <a:extLst>
+              <a:ext uri="{FF2B5EF4-FFF2-40B4-BE49-F238E27FC236}">
+                <a16:creationId xmlns:a16="http://schemas.microsoft.com/office/drawing/2014/main" id="{384CFC6F-5AFF-49E3-8FA7-6DC5B139EE15}"/>
+              </a:ext>
+            </a:extLst>
+          </p:cNvPr>
+          <p:cNvCxnSpPr>
+            <a:cxnSpLocks/>
+          </p:cNvCxnSpPr>
+          <p:nvPr/>
+        </p:nvCxnSpPr>
+        <p:spPr>
+          <a:xfrm flipH="1">
+            <a:off x="4024393" y="1982026"/>
+            <a:ext cx="445217" cy="956523"/>
+          </a:xfrm>
+          <a:prstGeom prst="line">
+            <a:avLst/>
+          </a:prstGeom>
+          <a:ln w="9525">
+            <a:solidFill>
+              <a:srgbClr val="FF0000"/>
+            </a:solidFill>
+          </a:ln>
+        </p:spPr>
+        <p:style>
+          <a:lnRef idx="2">
+            <a:schemeClr val="accent2"/>
+          </a:lnRef>
+          <a:fillRef idx="0">
+            <a:schemeClr val="accent2"/>
+          </a:fillRef>
+          <a:effectRef idx="1">
+            <a:schemeClr val="accent2"/>
+          </a:effectRef>
+          <a:fontRef idx="minor">
+            <a:schemeClr val="tx1"/>
+          </a:fontRef>
+        </p:style>
+      </p:cxnSp>
+      <p:cxnSp>
+        <p:nvCxnSpPr>
+          <p:cNvPr id="46" name="Straight Connector 45">
+            <a:extLst>
+              <a:ext uri="{FF2B5EF4-FFF2-40B4-BE49-F238E27FC236}">
+                <a16:creationId xmlns:a16="http://schemas.microsoft.com/office/drawing/2014/main" id="{69E2C67A-13BD-4F62-A638-EFDE058BCE9C}"/>
+              </a:ext>
+            </a:extLst>
+          </p:cNvPr>
+          <p:cNvCxnSpPr>
+            <a:cxnSpLocks/>
+          </p:cNvCxnSpPr>
+          <p:nvPr/>
+        </p:nvCxnSpPr>
+        <p:spPr>
+          <a:xfrm>
+            <a:off x="4571118" y="1980865"/>
+            <a:ext cx="446400" cy="957600"/>
+          </a:xfrm>
+          <a:prstGeom prst="line">
+            <a:avLst/>
+          </a:prstGeom>
+          <a:ln w="9525">
+            <a:solidFill>
+              <a:srgbClr val="FF0000"/>
+            </a:solidFill>
+          </a:ln>
+        </p:spPr>
+        <p:style>
+          <a:lnRef idx="2">
+            <a:schemeClr val="accent2"/>
+          </a:lnRef>
+          <a:fillRef idx="0">
+            <a:schemeClr val="accent2"/>
+          </a:fillRef>
+          <a:effectRef idx="1">
+            <a:schemeClr val="accent2"/>
+          </a:effectRef>
+          <a:fontRef idx="minor">
+            <a:schemeClr val="tx1"/>
+          </a:fontRef>
+        </p:style>
+      </p:cxnSp>
+    </p:spTree>
+    <p:extLst>
+      <p:ext uri="{BB962C8B-B14F-4D97-AF65-F5344CB8AC3E}">
+        <p14:creationId xmlns:p14="http://schemas.microsoft.com/office/powerpoint/2010/main" val="2233661357"/>
+      </p:ext>
+    </p:extLst>
+  </p:cSld>
+  <p:clrMapOvr>
+    <a:masterClrMapping/>
+  </p:clrMapOvr>
+</p:sld>
+</file>
+
+<file path=ppt/slides/slide3.xml><?xml version="1.0" encoding="utf-8"?>
+<p:sld xmlns:a="http://schemas.openxmlformats.org/drawingml/2006/main" xmlns:r="http://schemas.openxmlformats.org/officeDocument/2006/relationships" xmlns:p="http://schemas.openxmlformats.org/presentationml/2006/main">
+  <p:cSld>
+    <p:spTree>
+      <p:nvGrpSpPr>
+        <p:cNvPr id="1" name=""/>
+        <p:cNvGrpSpPr/>
+        <p:nvPr/>
+      </p:nvGrpSpPr>
+      <p:grpSpPr>
+        <a:xfrm>
+          <a:off x="0" y="0"/>
+          <a:ext cx="0" cy="0"/>
+          <a:chOff x="0" y="0"/>
+          <a:chExt cx="0" cy="0"/>
+        </a:xfrm>
+      </p:grpSpPr>
+      <p:pic>
+        <p:nvPicPr>
+          <p:cNvPr id="10" name="Picture 9" descr="A picture containing white, water&#10;&#10;Description automatically generated">
+            <a:extLst>
+              <a:ext uri="{FF2B5EF4-FFF2-40B4-BE49-F238E27FC236}">
+                <a16:creationId xmlns:a16="http://schemas.microsoft.com/office/drawing/2014/main" id="{B91E440D-19C9-4B42-A623-91EE1DABE070}"/>
+              </a:ext>
+            </a:extLst>
+          </p:cNvPr>
+          <p:cNvPicPr>
+            <a:picLocks noChangeAspect="1"/>
+          </p:cNvPicPr>
+          <p:nvPr/>
+        </p:nvPicPr>
+        <p:blipFill>
+          <a:blip r:embed="rId2">
+            <a:extLst>
+              <a:ext uri="{28A0092B-C50C-407E-A947-70E740481C1C}">
+                <a14:useLocalDpi xmlns:a14="http://schemas.microsoft.com/office/drawing/2010/main" val="0"/>
+              </a:ext>
+            </a:extLst>
+          </a:blip>
+          <a:stretch>
+            <a:fillRect/>
+          </a:stretch>
+        </p:blipFill>
+        <p:spPr>
+          <a:xfrm>
+            <a:off x="2438393" y="818395"/>
+            <a:ext cx="7315215" cy="5029210"/>
+          </a:xfrm>
+          <a:prstGeom prst="rect">
+            <a:avLst/>
+          </a:prstGeom>
+        </p:spPr>
+      </p:pic>
+      <p:sp>
+        <p:nvSpPr>
+          <p:cNvPr id="6" name="TextBox 5">
+            <a:extLst>
+              <a:ext uri="{FF2B5EF4-FFF2-40B4-BE49-F238E27FC236}">
+                <a16:creationId xmlns:a16="http://schemas.microsoft.com/office/drawing/2014/main" id="{ADFC0821-5809-4373-9D46-E574A498D6F6}"/>
+              </a:ext>
+            </a:extLst>
+          </p:cNvPr>
+          <p:cNvSpPr txBox="1"/>
+          <p:nvPr/>
+        </p:nvSpPr>
+        <p:spPr>
+          <a:xfrm>
+            <a:off x="4015947" y="886979"/>
+            <a:ext cx="4160107" cy="430887"/>
+          </a:xfrm>
+          <a:prstGeom prst="rect">
+            <a:avLst/>
+          </a:prstGeom>
+          <a:noFill/>
+        </p:spPr>
+        <p:txBody>
+          <a:bodyPr wrap="square" rtlCol="0">
+            <a:spAutoFit/>
+          </a:bodyPr>
+          <a:lstStyle/>
+          <a:p>
+            <a:r>
+              <a:rPr lang="en-CA" sz="2200" dirty="0">
+                <a:latin typeface="Avenir Next LT Pro Light" panose="020B0304020202020204" pitchFamily="34" charset="0"/>
+              </a:rPr>
+              <a:t>Ground State Error vs Iteration</a:t>
+            </a:r>
+          </a:p>
+        </p:txBody>
+      </p:sp>
+      <p:sp>
+        <p:nvSpPr>
+          <p:cNvPr id="7" name="TextBox 6">
+            <a:extLst>
+              <a:ext uri="{FF2B5EF4-FFF2-40B4-BE49-F238E27FC236}">
+                <a16:creationId xmlns:a16="http://schemas.microsoft.com/office/drawing/2014/main" id="{E2B93447-A1E7-4ADD-9748-3391D590CDF4}"/>
+              </a:ext>
+            </a:extLst>
+          </p:cNvPr>
+          <p:cNvSpPr txBox="1"/>
+          <p:nvPr/>
+        </p:nvSpPr>
+        <p:spPr>
+          <a:xfrm>
+            <a:off x="5534104" y="5596300"/>
+            <a:ext cx="1123793" cy="369332"/>
+          </a:xfrm>
+          <a:prstGeom prst="rect">
+            <a:avLst/>
+          </a:prstGeom>
+          <a:noFill/>
+        </p:spPr>
+        <p:txBody>
+          <a:bodyPr wrap="square" rtlCol="0">
+            <a:spAutoFit/>
+          </a:bodyPr>
+          <a:lstStyle/>
+          <a:p>
+            <a:r>
+              <a:rPr lang="en-CA" dirty="0">
+                <a:latin typeface="Avenir Next LT Pro Light" panose="020B0304020202020204" pitchFamily="34" charset="0"/>
+              </a:rPr>
+              <a:t>Iteration</a:t>
+            </a:r>
+          </a:p>
+        </p:txBody>
+      </p:sp>
+      <p:pic>
+        <p:nvPicPr>
+          <p:cNvPr id="8" name="Picture 7">
+            <a:extLst>
+              <a:ext uri="{FF2B5EF4-FFF2-40B4-BE49-F238E27FC236}">
+                <a16:creationId xmlns:a16="http://schemas.microsoft.com/office/drawing/2014/main" id="{A23478A2-5331-498D-B1A6-AE321E2E9B9C}"/>
+              </a:ext>
+            </a:extLst>
+          </p:cNvPr>
+          <p:cNvPicPr>
+            <a:picLocks noChangeAspect="1"/>
+          </p:cNvPicPr>
+          <p:nvPr/>
+        </p:nvPicPr>
+        <p:blipFill>
+          <a:blip r:embed="rId3"/>
+          <a:stretch>
+            <a:fillRect/>
+          </a:stretch>
+        </p:blipFill>
+        <p:spPr>
+          <a:xfrm rot="16200000">
+            <a:off x="1640510" y="3026529"/>
+            <a:ext cx="2088310" cy="410152"/>
+          </a:xfrm>
+          <a:prstGeom prst="rect">
+            <a:avLst/>
+          </a:prstGeom>
+        </p:spPr>
+      </p:pic>
+    </p:spTree>
+    <p:extLst>
+      <p:ext uri="{BB962C8B-B14F-4D97-AF65-F5344CB8AC3E}">
+        <p14:creationId xmlns:p14="http://schemas.microsoft.com/office/powerpoint/2010/main" val="111145971"/>
       </p:ext>
     </p:extLst>
   </p:cSld>

</xml_diff>